<commit_message>
más cosas de estabilidad de estructuras
</commit_message>
<xml_diff>
--- a/imagenes copia/Isomeros conformacionales1.pptx
+++ b/imagenes copia/Isomeros conformacionales1.pptx
@@ -248,7 +248,7 @@
           <a:p>
             <a:fld id="{2E8E7E32-25FF-7C40-B0B0-1E32FD43ECD5}" type="datetimeFigureOut">
               <a:rPr lang="es-ES_tradnl" smtClean="0"/>
-              <a:t>22/6/17</a:t>
+              <a:t>23/6/17</a:t>
             </a:fld>
             <a:endParaRPr lang="es-ES_tradnl"/>
           </a:p>
@@ -413,7 +413,7 @@
           <a:p>
             <a:fld id="{2E8E7E32-25FF-7C40-B0B0-1E32FD43ECD5}" type="datetimeFigureOut">
               <a:rPr lang="es-ES_tradnl" smtClean="0"/>
-              <a:t>22/6/17</a:t>
+              <a:t>23/6/17</a:t>
             </a:fld>
             <a:endParaRPr lang="es-ES_tradnl"/>
           </a:p>
@@ -588,7 +588,7 @@
           <a:p>
             <a:fld id="{2E8E7E32-25FF-7C40-B0B0-1E32FD43ECD5}" type="datetimeFigureOut">
               <a:rPr lang="es-ES_tradnl" smtClean="0"/>
-              <a:t>22/6/17</a:t>
+              <a:t>23/6/17</a:t>
             </a:fld>
             <a:endParaRPr lang="es-ES_tradnl"/>
           </a:p>
@@ -753,7 +753,7 @@
           <a:p>
             <a:fld id="{2E8E7E32-25FF-7C40-B0B0-1E32FD43ECD5}" type="datetimeFigureOut">
               <a:rPr lang="es-ES_tradnl" smtClean="0"/>
-              <a:t>22/6/17</a:t>
+              <a:t>23/6/17</a:t>
             </a:fld>
             <a:endParaRPr lang="es-ES_tradnl"/>
           </a:p>
@@ -992,7 +992,7 @@
           <a:p>
             <a:fld id="{2E8E7E32-25FF-7C40-B0B0-1E32FD43ECD5}" type="datetimeFigureOut">
               <a:rPr lang="es-ES_tradnl" smtClean="0"/>
-              <a:t>22/6/17</a:t>
+              <a:t>23/6/17</a:t>
             </a:fld>
             <a:endParaRPr lang="es-ES_tradnl"/>
           </a:p>
@@ -1219,7 +1219,7 @@
           <a:p>
             <a:fld id="{2E8E7E32-25FF-7C40-B0B0-1E32FD43ECD5}" type="datetimeFigureOut">
               <a:rPr lang="es-ES_tradnl" smtClean="0"/>
-              <a:t>22/6/17</a:t>
+              <a:t>23/6/17</a:t>
             </a:fld>
             <a:endParaRPr lang="es-ES_tradnl"/>
           </a:p>
@@ -1581,7 +1581,7 @@
           <a:p>
             <a:fld id="{2E8E7E32-25FF-7C40-B0B0-1E32FD43ECD5}" type="datetimeFigureOut">
               <a:rPr lang="es-ES_tradnl" smtClean="0"/>
-              <a:t>22/6/17</a:t>
+              <a:t>23/6/17</a:t>
             </a:fld>
             <a:endParaRPr lang="es-ES_tradnl"/>
           </a:p>
@@ -1694,7 +1694,7 @@
           <a:p>
             <a:fld id="{2E8E7E32-25FF-7C40-B0B0-1E32FD43ECD5}" type="datetimeFigureOut">
               <a:rPr lang="es-ES_tradnl" smtClean="0"/>
-              <a:t>22/6/17</a:t>
+              <a:t>23/6/17</a:t>
             </a:fld>
             <a:endParaRPr lang="es-ES_tradnl"/>
           </a:p>
@@ -1784,7 +1784,7 @@
           <a:p>
             <a:fld id="{2E8E7E32-25FF-7C40-B0B0-1E32FD43ECD5}" type="datetimeFigureOut">
               <a:rPr lang="es-ES_tradnl" smtClean="0"/>
-              <a:t>22/6/17</a:t>
+              <a:t>23/6/17</a:t>
             </a:fld>
             <a:endParaRPr lang="es-ES_tradnl"/>
           </a:p>
@@ -2056,7 +2056,7 @@
           <a:p>
             <a:fld id="{2E8E7E32-25FF-7C40-B0B0-1E32FD43ECD5}" type="datetimeFigureOut">
               <a:rPr lang="es-ES_tradnl" smtClean="0"/>
-              <a:t>22/6/17</a:t>
+              <a:t>23/6/17</a:t>
             </a:fld>
             <a:endParaRPr lang="es-ES_tradnl"/>
           </a:p>
@@ -2308,7 +2308,7 @@
           <a:p>
             <a:fld id="{2E8E7E32-25FF-7C40-B0B0-1E32FD43ECD5}" type="datetimeFigureOut">
               <a:rPr lang="es-ES_tradnl" smtClean="0"/>
-              <a:t>22/6/17</a:t>
+              <a:t>23/6/17</a:t>
             </a:fld>
             <a:endParaRPr lang="es-ES_tradnl"/>
           </a:p>
@@ -2516,7 +2516,7 @@
           <a:p>
             <a:fld id="{2E8E7E32-25FF-7C40-B0B0-1E32FD43ECD5}" type="datetimeFigureOut">
               <a:rPr lang="es-ES_tradnl" smtClean="0"/>
-              <a:t>22/6/17</a:t>
+              <a:t>23/6/17</a:t>
             </a:fld>
             <a:endParaRPr lang="es-ES_tradnl"/>
           </a:p>
@@ -2923,534 +2923,6 @@
       </p:grpSpPr>
       <p:pic>
         <p:nvPicPr>
-          <p:cNvPr id="6" name="Marcador de contenido 5"/>
-          <p:cNvPicPr>
-            <a:picLocks noGrp="1" noChangeAspect="1"/>
-          </p:cNvPicPr>
-          <p:nvPr>
-            <p:ph idx="1"/>
-          </p:nvPr>
-        </p:nvPicPr>
-        <p:blipFill>
-          <a:blip r:embed="rId2">
-            <a:extLst>
-              <a:ext uri="{28A0092B-C50C-407E-A947-70E740481C1C}">
-                <a14:useLocalDpi xmlns:a14="http://schemas.microsoft.com/office/drawing/2010/main" val="0"/>
-              </a:ext>
-            </a:extLst>
-          </a:blip>
-          <a:stretch>
-            <a:fillRect/>
-          </a:stretch>
-        </p:blipFill>
-        <p:spPr>
-          <a:xfrm>
-            <a:off x="4594961" y="3280834"/>
-            <a:ext cx="1750891" cy="1354961"/>
-          </a:xfrm>
-        </p:spPr>
-      </p:pic>
-      <p:pic>
-        <p:nvPicPr>
-          <p:cNvPr id="10" name="Imagen 9"/>
-          <p:cNvPicPr>
-            <a:picLocks noChangeAspect="1"/>
-          </p:cNvPicPr>
-          <p:nvPr/>
-        </p:nvPicPr>
-        <p:blipFill>
-          <a:blip r:embed="rId3">
-            <a:extLst>
-              <a:ext uri="{28A0092B-C50C-407E-A947-70E740481C1C}">
-                <a14:useLocalDpi xmlns:a14="http://schemas.microsoft.com/office/drawing/2010/main" val="0"/>
-              </a:ext>
-            </a:extLst>
-          </a:blip>
-          <a:stretch>
-            <a:fillRect/>
-          </a:stretch>
-        </p:blipFill>
-        <p:spPr>
-          <a:xfrm>
-            <a:off x="2222308" y="3280834"/>
-            <a:ext cx="1906852" cy="1184840"/>
-          </a:xfrm>
-          <a:prstGeom prst="rect">
-            <a:avLst/>
-          </a:prstGeom>
-        </p:spPr>
-      </p:pic>
-      <p:pic>
-        <p:nvPicPr>
-          <p:cNvPr id="12" name="Imagen 11"/>
-          <p:cNvPicPr>
-            <a:picLocks noChangeAspect="1"/>
-          </p:cNvPicPr>
-          <p:nvPr/>
-        </p:nvPicPr>
-        <p:blipFill>
-          <a:blip r:embed="rId4">
-            <a:extLst>
-              <a:ext uri="{28A0092B-C50C-407E-A947-70E740481C1C}">
-                <a14:useLocalDpi xmlns:a14="http://schemas.microsoft.com/office/drawing/2010/main" val="0"/>
-              </a:ext>
-            </a:extLst>
-          </a:blip>
-          <a:stretch>
-            <a:fillRect/>
-          </a:stretch>
-        </p:blipFill>
-        <p:spPr>
-          <a:xfrm rot="5400000">
-            <a:off x="4408151" y="5576157"/>
-            <a:ext cx="1354960" cy="1634555"/>
-          </a:xfrm>
-          <a:prstGeom prst="rect">
-            <a:avLst/>
-          </a:prstGeom>
-        </p:spPr>
-      </p:pic>
-      <p:pic>
-        <p:nvPicPr>
-          <p:cNvPr id="9" name="Marcador de contenido 3"/>
-          <p:cNvPicPr>
-            <a:picLocks noChangeAspect="1"/>
-          </p:cNvPicPr>
-          <p:nvPr/>
-        </p:nvPicPr>
-        <p:blipFill>
-          <a:blip r:embed="rId5">
-            <a:extLst>
-              <a:ext uri="{28A0092B-C50C-407E-A947-70E740481C1C}">
-                <a14:useLocalDpi xmlns:a14="http://schemas.microsoft.com/office/drawing/2010/main" val="0"/>
-              </a:ext>
-            </a:extLst>
-          </a:blip>
-          <a:stretch>
-            <a:fillRect/>
-          </a:stretch>
-        </p:blipFill>
-        <p:spPr>
-          <a:xfrm>
-            <a:off x="357385" y="5161007"/>
-            <a:ext cx="1756340" cy="1229859"/>
-          </a:xfrm>
-          <a:prstGeom prst="rect">
-            <a:avLst/>
-          </a:prstGeom>
-        </p:spPr>
-      </p:pic>
-      <p:sp>
-        <p:nvSpPr>
-          <p:cNvPr id="2" name="Rectángulo 1"/>
-          <p:cNvSpPr/>
-          <p:nvPr/>
-        </p:nvSpPr>
-        <p:spPr>
-          <a:xfrm>
-            <a:off x="471488" y="6515968"/>
-            <a:ext cx="1545905" cy="400110"/>
-          </a:xfrm>
-          <a:prstGeom prst="rect">
-            <a:avLst/>
-          </a:prstGeom>
-        </p:spPr>
-        <p:txBody>
-          <a:bodyPr wrap="square">
-            <a:spAutoFit/>
-          </a:bodyPr>
-          <a:lstStyle/>
-          <a:p>
-            <a:r>
-              <a:rPr lang="es-ES_tradnl" sz="2000" dirty="0"/>
-              <a:t>H</a:t>
-            </a:r>
-            <a:r>
-              <a:rPr lang="es-ES_tradnl" sz="2000" baseline="-25000" dirty="0"/>
-              <a:t>2</a:t>
-            </a:r>
-            <a:r>
-              <a:rPr lang="es-ES_tradnl" sz="2000" dirty="0"/>
-              <a:t>CO</a:t>
-            </a:r>
-            <a:r>
-              <a:rPr lang="es-ES_tradnl" sz="2000" baseline="-25000" dirty="0"/>
-              <a:t>3</a:t>
-            </a:r>
-            <a:endParaRPr lang="es-ES_tradnl" sz="2000" dirty="0"/>
-          </a:p>
-        </p:txBody>
-      </p:sp>
-      <p:pic>
-        <p:nvPicPr>
-          <p:cNvPr id="14" name="Imagen 13"/>
-          <p:cNvPicPr>
-            <a:picLocks noChangeAspect="1"/>
-          </p:cNvPicPr>
-          <p:nvPr/>
-        </p:nvPicPr>
-        <p:blipFill>
-          <a:blip r:embed="rId6">
-            <a:extLst>
-              <a:ext uri="{28A0092B-C50C-407E-A947-70E740481C1C}">
-                <a14:useLocalDpi xmlns:a14="http://schemas.microsoft.com/office/drawing/2010/main" val="0"/>
-              </a:ext>
-            </a:extLst>
-          </a:blip>
-          <a:stretch>
-            <a:fillRect/>
-          </a:stretch>
-        </p:blipFill>
-        <p:spPr>
-          <a:xfrm>
-            <a:off x="2222308" y="5161007"/>
-            <a:ext cx="1577853" cy="1527226"/>
-          </a:xfrm>
-          <a:prstGeom prst="rect">
-            <a:avLst/>
-          </a:prstGeom>
-        </p:spPr>
-      </p:pic>
-      <p:sp>
-        <p:nvSpPr>
-          <p:cNvPr id="3" name="Rectángulo 2"/>
-          <p:cNvSpPr/>
-          <p:nvPr/>
-        </p:nvSpPr>
-        <p:spPr>
-          <a:xfrm>
-            <a:off x="2222308" y="6515968"/>
-            <a:ext cx="1009764" cy="400110"/>
-          </a:xfrm>
-          <a:prstGeom prst="rect">
-            <a:avLst/>
-          </a:prstGeom>
-        </p:spPr>
-        <p:txBody>
-          <a:bodyPr wrap="none">
-            <a:spAutoFit/>
-          </a:bodyPr>
-          <a:lstStyle/>
-          <a:p>
-            <a:r>
-              <a:rPr lang="es-ES_tradnl" sz="2000" dirty="0"/>
-              <a:t>H</a:t>
-            </a:r>
-            <a:r>
-              <a:rPr lang="es-ES_tradnl" sz="2000" baseline="-25000" dirty="0"/>
-              <a:t>2</a:t>
-            </a:r>
-            <a:r>
-              <a:rPr lang="es-ES_tradnl" sz="2000" dirty="0"/>
-              <a:t>CO</a:t>
-            </a:r>
-            <a:r>
-              <a:rPr lang="es-ES_tradnl" sz="2000" baseline="-25000" dirty="0"/>
-              <a:t>3</a:t>
-            </a:r>
-            <a:r>
-              <a:rPr lang="es-ES_tradnl" sz="2000" dirty="0"/>
-              <a:t> 1</a:t>
-            </a:r>
-          </a:p>
-        </p:txBody>
-      </p:sp>
-      <p:pic>
-        <p:nvPicPr>
-          <p:cNvPr id="15" name="Marcador de contenido 3"/>
-          <p:cNvPicPr>
-            <a:picLocks noChangeAspect="1"/>
-          </p:cNvPicPr>
-          <p:nvPr/>
-        </p:nvPicPr>
-        <p:blipFill>
-          <a:blip r:embed="rId7">
-            <a:extLst>
-              <a:ext uri="{28A0092B-C50C-407E-A947-70E740481C1C}">
-                <a14:useLocalDpi xmlns:a14="http://schemas.microsoft.com/office/drawing/2010/main" val="0"/>
-              </a:ext>
-            </a:extLst>
-          </a:blip>
-          <a:stretch>
-            <a:fillRect/>
-          </a:stretch>
-        </p:blipFill>
-        <p:spPr>
-          <a:xfrm>
-            <a:off x="321696" y="7041180"/>
-            <a:ext cx="1705934" cy="1304260"/>
-          </a:xfrm>
-          <a:prstGeom prst="rect">
-            <a:avLst/>
-          </a:prstGeom>
-        </p:spPr>
-      </p:pic>
-      <p:sp>
-        <p:nvSpPr>
-          <p:cNvPr id="5" name="Rectángulo 4"/>
-          <p:cNvSpPr/>
-          <p:nvPr/>
-        </p:nvSpPr>
-        <p:spPr>
-          <a:xfrm>
-            <a:off x="471488" y="8582698"/>
-            <a:ext cx="821059" cy="400110"/>
-          </a:xfrm>
-          <a:prstGeom prst="rect">
-            <a:avLst/>
-          </a:prstGeom>
-        </p:spPr>
-        <p:txBody>
-          <a:bodyPr wrap="none">
-            <a:spAutoFit/>
-          </a:bodyPr>
-          <a:lstStyle/>
-          <a:p>
-            <a:r>
-              <a:rPr lang="es-ES_tradnl" sz="2000" dirty="0"/>
-              <a:t>H</a:t>
-            </a:r>
-            <a:r>
-              <a:rPr lang="es-ES_tradnl" sz="2000" baseline="-25000" dirty="0"/>
-              <a:t>3</a:t>
-            </a:r>
-            <a:r>
-              <a:rPr lang="es-ES_tradnl" sz="2000" dirty="0"/>
-              <a:t>PO</a:t>
-            </a:r>
-            <a:r>
-              <a:rPr lang="es-ES_tradnl" sz="2000" baseline="-25000" dirty="0"/>
-              <a:t>4</a:t>
-            </a:r>
-            <a:endParaRPr lang="es-ES_tradnl" dirty="0"/>
-          </a:p>
-        </p:txBody>
-      </p:sp>
-      <p:pic>
-        <p:nvPicPr>
-          <p:cNvPr id="16" name="Imagen 15"/>
-          <p:cNvPicPr>
-            <a:picLocks noChangeAspect="1"/>
-          </p:cNvPicPr>
-          <p:nvPr/>
-        </p:nvPicPr>
-        <p:blipFill>
-          <a:blip r:embed="rId8">
-            <a:extLst>
-              <a:ext uri="{28A0092B-C50C-407E-A947-70E740481C1C}">
-                <a14:useLocalDpi xmlns:a14="http://schemas.microsoft.com/office/drawing/2010/main" val="0"/>
-              </a:ext>
-            </a:extLst>
-          </a:blip>
-          <a:stretch>
-            <a:fillRect/>
-          </a:stretch>
-        </p:blipFill>
-        <p:spPr>
-          <a:xfrm>
-            <a:off x="2222308" y="7041180"/>
-            <a:ext cx="1392762" cy="1586875"/>
-          </a:xfrm>
-          <a:prstGeom prst="rect">
-            <a:avLst/>
-          </a:prstGeom>
-        </p:spPr>
-      </p:pic>
-      <p:sp>
-        <p:nvSpPr>
-          <p:cNvPr id="8" name="Rectángulo 7"/>
-          <p:cNvSpPr/>
-          <p:nvPr/>
-        </p:nvSpPr>
-        <p:spPr>
-          <a:xfrm>
-            <a:off x="2223463" y="8582698"/>
-            <a:ext cx="1008609" cy="400110"/>
-          </a:xfrm>
-          <a:prstGeom prst="rect">
-            <a:avLst/>
-          </a:prstGeom>
-        </p:spPr>
-        <p:txBody>
-          <a:bodyPr wrap="none">
-            <a:spAutoFit/>
-          </a:bodyPr>
-          <a:lstStyle/>
-          <a:p>
-            <a:r>
-              <a:rPr lang="es-ES_tradnl" sz="2000" dirty="0"/>
-              <a:t>H</a:t>
-            </a:r>
-            <a:r>
-              <a:rPr lang="es-ES_tradnl" sz="2000" baseline="-25000" dirty="0"/>
-              <a:t>3</a:t>
-            </a:r>
-            <a:r>
-              <a:rPr lang="es-ES_tradnl" sz="2000" dirty="0"/>
-              <a:t>PO</a:t>
-            </a:r>
-            <a:r>
-              <a:rPr lang="es-ES_tradnl" sz="2000" baseline="-25000" dirty="0"/>
-              <a:t>4</a:t>
-            </a:r>
-            <a:r>
-              <a:rPr lang="es-ES_tradnl" sz="2000" dirty="0"/>
-              <a:t> 1</a:t>
-            </a:r>
-          </a:p>
-        </p:txBody>
-      </p:sp>
-      <p:pic>
-        <p:nvPicPr>
-          <p:cNvPr id="17" name="Imagen 16"/>
-          <p:cNvPicPr>
-            <a:picLocks noChangeAspect="1"/>
-          </p:cNvPicPr>
-          <p:nvPr/>
-        </p:nvPicPr>
-        <p:blipFill>
-          <a:blip r:embed="rId9">
-            <a:extLst>
-              <a:ext uri="{28A0092B-C50C-407E-A947-70E740481C1C}">
-                <a14:useLocalDpi xmlns:a14="http://schemas.microsoft.com/office/drawing/2010/main" val="0"/>
-              </a:ext>
-            </a:extLst>
-          </a:blip>
-          <a:stretch>
-            <a:fillRect/>
-          </a:stretch>
-        </p:blipFill>
-        <p:spPr>
-          <a:xfrm>
-            <a:off x="3810783" y="7056736"/>
-            <a:ext cx="1659623" cy="1288704"/>
-          </a:xfrm>
-          <a:prstGeom prst="rect">
-            <a:avLst/>
-          </a:prstGeom>
-        </p:spPr>
-      </p:pic>
-      <p:sp>
-        <p:nvSpPr>
-          <p:cNvPr id="18" name="Rectángulo 17"/>
-          <p:cNvSpPr/>
-          <p:nvPr/>
-        </p:nvSpPr>
-        <p:spPr>
-          <a:xfrm>
-            <a:off x="4006368" y="8582698"/>
-            <a:ext cx="1008609" cy="400110"/>
-          </a:xfrm>
-          <a:prstGeom prst="rect">
-            <a:avLst/>
-          </a:prstGeom>
-        </p:spPr>
-        <p:txBody>
-          <a:bodyPr wrap="none">
-            <a:spAutoFit/>
-          </a:bodyPr>
-          <a:lstStyle/>
-          <a:p>
-            <a:r>
-              <a:rPr lang="es-ES_tradnl" sz="2000" dirty="0"/>
-              <a:t>H</a:t>
-            </a:r>
-            <a:r>
-              <a:rPr lang="es-ES_tradnl" sz="2000" baseline="-25000" dirty="0"/>
-              <a:t>3</a:t>
-            </a:r>
-            <a:r>
-              <a:rPr lang="es-ES_tradnl" sz="2000" dirty="0"/>
-              <a:t>PO</a:t>
-            </a:r>
-            <a:r>
-              <a:rPr lang="es-ES_tradnl" sz="2000" baseline="-25000" dirty="0"/>
-              <a:t>4</a:t>
-            </a:r>
-            <a:r>
-              <a:rPr lang="es-ES_tradnl" sz="2000" dirty="0"/>
-              <a:t> 2</a:t>
-            </a:r>
-          </a:p>
-        </p:txBody>
-      </p:sp>
-      <p:pic>
-        <p:nvPicPr>
-          <p:cNvPr id="19" name="Imagen 18"/>
-          <p:cNvPicPr>
-            <a:picLocks noChangeAspect="1"/>
-          </p:cNvPicPr>
-          <p:nvPr/>
-        </p:nvPicPr>
-        <p:blipFill>
-          <a:blip r:embed="rId10">
-            <a:extLst>
-              <a:ext uri="{28A0092B-C50C-407E-A947-70E740481C1C}">
-                <a14:useLocalDpi xmlns:a14="http://schemas.microsoft.com/office/drawing/2010/main" val="0"/>
-              </a:ext>
-            </a:extLst>
-          </a:blip>
-          <a:stretch>
-            <a:fillRect/>
-          </a:stretch>
-        </p:blipFill>
-        <p:spPr>
-          <a:xfrm>
-            <a:off x="357385" y="9220066"/>
-            <a:ext cx="1540957" cy="1423147"/>
-          </a:xfrm>
-          <a:prstGeom prst="rect">
-            <a:avLst/>
-          </a:prstGeom>
-        </p:spPr>
-      </p:pic>
-      <p:sp>
-        <p:nvSpPr>
-          <p:cNvPr id="20" name="Rectángulo 19"/>
-          <p:cNvSpPr/>
-          <p:nvPr/>
-        </p:nvSpPr>
-        <p:spPr>
-          <a:xfrm>
-            <a:off x="471488" y="10880471"/>
-            <a:ext cx="1008609" cy="400110"/>
-          </a:xfrm>
-          <a:prstGeom prst="rect">
-            <a:avLst/>
-          </a:prstGeom>
-        </p:spPr>
-        <p:txBody>
-          <a:bodyPr wrap="none">
-            <a:spAutoFit/>
-          </a:bodyPr>
-          <a:lstStyle/>
-          <a:p>
-            <a:r>
-              <a:rPr lang="es-ES_tradnl" sz="2000" dirty="0" smtClean="0"/>
-              <a:t>H</a:t>
-            </a:r>
-            <a:r>
-              <a:rPr lang="es-ES_tradnl" sz="2000" baseline="-25000" dirty="0" smtClean="0"/>
-              <a:t>3</a:t>
-            </a:r>
-            <a:r>
-              <a:rPr lang="es-ES_tradnl" sz="2000" dirty="0" smtClean="0"/>
-              <a:t>PO</a:t>
-            </a:r>
-            <a:r>
-              <a:rPr lang="es-ES_tradnl" sz="2000" baseline="-25000" dirty="0" smtClean="0"/>
-              <a:t>4</a:t>
-            </a:r>
-            <a:r>
-              <a:rPr lang="es-ES_tradnl" sz="2000" dirty="0" smtClean="0"/>
-              <a:t> 3</a:t>
-            </a:r>
-            <a:endParaRPr lang="es-ES_tradnl" sz="2000" dirty="0"/>
-          </a:p>
-        </p:txBody>
-      </p:sp>
-      <p:pic>
-        <p:nvPicPr>
           <p:cNvPr id="21" name="Imagen 20"/>
           <p:cNvPicPr>
             <a:picLocks noChangeAspect="1"/>
@@ -3458,7 +2930,7 @@
           <p:nvPr/>
         </p:nvPicPr>
         <p:blipFill>
-          <a:blip r:embed="rId11">
+          <a:blip r:embed="rId2">
             <a:extLst>
               <a:ext uri="{28A0092B-C50C-407E-A947-70E740481C1C}">
                 <a14:useLocalDpi xmlns:a14="http://schemas.microsoft.com/office/drawing/2010/main" val="0"/>
@@ -3658,7 +3130,7 @@
           <p:nvPr/>
         </p:nvPicPr>
         <p:blipFill>
-          <a:blip r:embed="rId12">
+          <a:blip r:embed="rId3">
             <a:extLst>
               <a:ext uri="{28A0092B-C50C-407E-A947-70E740481C1C}">
                 <a14:useLocalDpi xmlns:a14="http://schemas.microsoft.com/office/drawing/2010/main" val="0"/>
@@ -3809,7 +3281,7 @@
           <p:nvPr/>
         </p:nvPicPr>
         <p:blipFill>
-          <a:blip r:embed="rId13">
+          <a:blip r:embed="rId4">
             <a:extLst>
               <a:ext uri="{28A0092B-C50C-407E-A947-70E740481C1C}">
                 <a14:useLocalDpi xmlns:a14="http://schemas.microsoft.com/office/drawing/2010/main" val="0"/>
@@ -4052,6 +3524,246 @@
               <a:rPr lang="es-ES_tradnl" sz="1400" dirty="0"/>
               <a:t> 2</a:t>
             </a:r>
+          </a:p>
+        </p:txBody>
+      </p:sp>
+      <p:pic>
+        <p:nvPicPr>
+          <p:cNvPr id="7" name="Imagen 6"/>
+          <p:cNvPicPr>
+            <a:picLocks noChangeAspect="1"/>
+          </p:cNvPicPr>
+          <p:nvPr/>
+        </p:nvPicPr>
+        <p:blipFill>
+          <a:blip r:embed="rId5">
+            <a:extLst>
+              <a:ext uri="{28A0092B-C50C-407E-A947-70E740481C1C}">
+                <a14:useLocalDpi xmlns:a14="http://schemas.microsoft.com/office/drawing/2010/main" val="0"/>
+              </a:ext>
+            </a:extLst>
+          </a:blip>
+          <a:stretch>
+            <a:fillRect/>
+          </a:stretch>
+        </p:blipFill>
+        <p:spPr>
+          <a:xfrm>
+            <a:off x="732570" y="3390486"/>
+            <a:ext cx="2739029" cy="2162391"/>
+          </a:xfrm>
+          <a:prstGeom prst="rect">
+            <a:avLst/>
+          </a:prstGeom>
+        </p:spPr>
+      </p:pic>
+      <p:sp>
+        <p:nvSpPr>
+          <p:cNvPr id="11" name="CuadroTexto 10"/>
+          <p:cNvSpPr txBox="1"/>
+          <p:nvPr/>
+        </p:nvSpPr>
+        <p:spPr>
+          <a:xfrm>
+            <a:off x="1893791" y="5552877"/>
+            <a:ext cx="912750" cy="307777"/>
+          </a:xfrm>
+          <a:prstGeom prst="rect">
+            <a:avLst/>
+          </a:prstGeom>
+          <a:noFill/>
+        </p:spPr>
+        <p:txBody>
+          <a:bodyPr wrap="square" rtlCol="0">
+            <a:spAutoFit/>
+          </a:bodyPr>
+          <a:lstStyle/>
+          <a:p>
+            <a:r>
+              <a:rPr lang="es-ES_tradnl" sz="1400" dirty="0" smtClean="0"/>
+              <a:t>Isómero 4</a:t>
+            </a:r>
+            <a:endParaRPr lang="es-ES_tradnl" sz="1400" dirty="0"/>
+          </a:p>
+        </p:txBody>
+      </p:sp>
+      <p:pic>
+        <p:nvPicPr>
+          <p:cNvPr id="13" name="Imagen 12"/>
+          <p:cNvPicPr>
+            <a:picLocks noChangeAspect="1"/>
+          </p:cNvPicPr>
+          <p:nvPr/>
+        </p:nvPicPr>
+        <p:blipFill>
+          <a:blip r:embed="rId6">
+            <a:extLst>
+              <a:ext uri="{28A0092B-C50C-407E-A947-70E740481C1C}">
+                <a14:useLocalDpi xmlns:a14="http://schemas.microsoft.com/office/drawing/2010/main" val="0"/>
+              </a:ext>
+            </a:extLst>
+          </a:blip>
+          <a:stretch>
+            <a:fillRect/>
+          </a:stretch>
+        </p:blipFill>
+        <p:spPr>
+          <a:xfrm>
+            <a:off x="3895909" y="3390487"/>
+            <a:ext cx="2743752" cy="2057814"/>
+          </a:xfrm>
+          <a:prstGeom prst="rect">
+            <a:avLst/>
+          </a:prstGeom>
+        </p:spPr>
+      </p:pic>
+      <p:sp>
+        <p:nvSpPr>
+          <p:cNvPr id="22" name="CuadroTexto 21"/>
+          <p:cNvSpPr txBox="1"/>
+          <p:nvPr/>
+        </p:nvSpPr>
+        <p:spPr>
+          <a:xfrm>
+            <a:off x="4509325" y="5552877"/>
+            <a:ext cx="912750" cy="307777"/>
+          </a:xfrm>
+          <a:prstGeom prst="rect">
+            <a:avLst/>
+          </a:prstGeom>
+          <a:noFill/>
+        </p:spPr>
+        <p:txBody>
+          <a:bodyPr wrap="none" rtlCol="0">
+            <a:spAutoFit/>
+          </a:bodyPr>
+          <a:lstStyle/>
+          <a:p>
+            <a:r>
+              <a:rPr lang="es-ES_tradnl" sz="1400" dirty="0" smtClean="0"/>
+              <a:t>Isómero 5</a:t>
+            </a:r>
+            <a:endParaRPr lang="es-ES_tradnl" sz="1400" dirty="0"/>
+          </a:p>
+        </p:txBody>
+      </p:sp>
+      <p:sp>
+        <p:nvSpPr>
+          <p:cNvPr id="24" name="CuadroTexto 23"/>
+          <p:cNvSpPr txBox="1"/>
+          <p:nvPr/>
+        </p:nvSpPr>
+        <p:spPr>
+          <a:xfrm>
+            <a:off x="1595410" y="4979668"/>
+            <a:ext cx="611065" cy="338554"/>
+          </a:xfrm>
+          <a:prstGeom prst="rect">
+            <a:avLst/>
+          </a:prstGeom>
+          <a:noFill/>
+        </p:spPr>
+        <p:txBody>
+          <a:bodyPr wrap="none" rtlCol="0">
+            <a:spAutoFit/>
+          </a:bodyPr>
+          <a:lstStyle/>
+          <a:p>
+            <a:r>
+              <a:rPr lang="es-ES_tradnl" sz="1600" dirty="0" smtClean="0"/>
+              <a:t>-0,25</a:t>
+            </a:r>
+            <a:endParaRPr lang="es-ES_tradnl" sz="1600" dirty="0"/>
+          </a:p>
+        </p:txBody>
+      </p:sp>
+      <p:sp>
+        <p:nvSpPr>
+          <p:cNvPr id="25" name="CuadroTexto 24"/>
+          <p:cNvSpPr txBox="1"/>
+          <p:nvPr/>
+        </p:nvSpPr>
+        <p:spPr>
+          <a:xfrm>
+            <a:off x="2888085" y="5086713"/>
+            <a:ext cx="514598" cy="276999"/>
+          </a:xfrm>
+          <a:prstGeom prst="rect">
+            <a:avLst/>
+          </a:prstGeom>
+          <a:noFill/>
+        </p:spPr>
+        <p:txBody>
+          <a:bodyPr wrap="square" rtlCol="0">
+            <a:spAutoFit/>
+          </a:bodyPr>
+          <a:lstStyle/>
+          <a:p>
+            <a:r>
+              <a:rPr lang="es-ES_tradnl" sz="1200" dirty="0" smtClean="0"/>
+              <a:t>0,28</a:t>
+            </a:r>
+            <a:endParaRPr lang="es-ES_tradnl" sz="1200" dirty="0"/>
+          </a:p>
+        </p:txBody>
+      </p:sp>
+      <p:sp>
+        <p:nvSpPr>
+          <p:cNvPr id="26" name="CuadroTexto 25"/>
+          <p:cNvSpPr txBox="1"/>
+          <p:nvPr/>
+        </p:nvSpPr>
+        <p:spPr>
+          <a:xfrm>
+            <a:off x="4163585" y="3506724"/>
+            <a:ext cx="503664" cy="307777"/>
+          </a:xfrm>
+          <a:prstGeom prst="rect">
+            <a:avLst/>
+          </a:prstGeom>
+          <a:noFill/>
+        </p:spPr>
+        <p:txBody>
+          <a:bodyPr wrap="none" rtlCol="0">
+            <a:spAutoFit/>
+          </a:bodyPr>
+          <a:lstStyle/>
+          <a:p>
+            <a:r>
+              <a:rPr lang="es-ES_tradnl" sz="1400" dirty="0" smtClean="0"/>
+              <a:t>0,26</a:t>
+            </a:r>
+            <a:endParaRPr lang="es-ES_tradnl" sz="1400" dirty="0"/>
+          </a:p>
+        </p:txBody>
+      </p:sp>
+      <p:sp>
+        <p:nvSpPr>
+          <p:cNvPr id="32" name="CuadroTexto 31"/>
+          <p:cNvSpPr txBox="1"/>
+          <p:nvPr/>
+        </p:nvSpPr>
+        <p:spPr>
+          <a:xfrm>
+            <a:off x="3899268" y="4924458"/>
+            <a:ext cx="611065" cy="338554"/>
+          </a:xfrm>
+          <a:prstGeom prst="rect">
+            <a:avLst/>
+          </a:prstGeom>
+          <a:noFill/>
+        </p:spPr>
+        <p:txBody>
+          <a:bodyPr wrap="none" rtlCol="0">
+            <a:spAutoFit/>
+          </a:bodyPr>
+          <a:lstStyle/>
+          <a:p>
+            <a:r>
+              <a:rPr lang="es-ES_tradnl" sz="1600" dirty="0" smtClean="0"/>
+              <a:t>-0,65</a:t>
+            </a:r>
+            <a:endParaRPr lang="es-ES_tradnl" sz="1600" dirty="0"/>
           </a:p>
         </p:txBody>
       </p:sp>

</xml_diff>